<commit_message>
Add all presentations (pak s frto @lubi222)
</commit_message>
<xml_diff>
--- a/prezentacii/1. Движения при растенията.pptx
+++ b/prezentacii/1. Движения при растенията.pptx
@@ -2,21 +2,21 @@
 <file path=ppt/presentation.xml><?xml version="1.0" encoding="utf-8"?>
 <p:presentation xmlns:a="http://schemas.openxmlformats.org/drawingml/2006/main" xmlns:r="http://schemas.openxmlformats.org/officeDocument/2006/relationships" xmlns:p="http://schemas.openxmlformats.org/presentationml/2006/main" saveSubsetFonts="1">
   <p:sldMasterIdLst>
-    <p:sldMasterId id="2147483660" r:id="rId1"/>
+    <p:sldMasterId id="2147483660" r:id="rId4"/>
   </p:sldMasterIdLst>
   <p:sldIdLst>
-    <p:sldId id="256" r:id="rId2"/>
-    <p:sldId id="257" r:id="rId3"/>
-    <p:sldId id="258" r:id="rId4"/>
-    <p:sldId id="260" r:id="rId5"/>
-    <p:sldId id="259" r:id="rId6"/>
-    <p:sldId id="261" r:id="rId7"/>
-    <p:sldId id="262" r:id="rId8"/>
-    <p:sldId id="263" r:id="rId9"/>
-    <p:sldId id="264" r:id="rId10"/>
-    <p:sldId id="265" r:id="rId11"/>
-    <p:sldId id="266" r:id="rId12"/>
-    <p:sldId id="267" r:id="rId13"/>
+    <p:sldId id="256" r:id="rId5"/>
+    <p:sldId id="257" r:id="rId6"/>
+    <p:sldId id="258" r:id="rId7"/>
+    <p:sldId id="260" r:id="rId8"/>
+    <p:sldId id="259" r:id="rId9"/>
+    <p:sldId id="261" r:id="rId10"/>
+    <p:sldId id="262" r:id="rId11"/>
+    <p:sldId id="263" r:id="rId12"/>
+    <p:sldId id="264" r:id="rId13"/>
+    <p:sldId id="265" r:id="rId14"/>
+    <p:sldId id="266" r:id="rId15"/>
+    <p:sldId id="267" r:id="rId16"/>
   </p:sldIdLst>
   <p:sldSz cx="9144000" cy="6858000" type="screen4x3"/>
   <p:notesSz cx="6858000" cy="9144000"/>
@@ -115,6 +115,22 @@
       </a:defRPr>
     </a:lvl9pPr>
   </p:defaultTextStyle>
+  <p:extLst>
+    <p:ext uri="{EFAFB233-063F-42B5-8137-9DF3F51BA10A}">
+      <p15:sldGuideLst xmlns:p15="http://schemas.microsoft.com/office/powerpoint/2012/main">
+        <p15:guide id="1" orient="horz" pos="2160">
+          <p15:clr>
+            <a:srgbClr val="A4A3A4"/>
+          </p15:clr>
+        </p15:guide>
+        <p15:guide id="2" pos="2880">
+          <p15:clr>
+            <a:srgbClr val="A4A3A4"/>
+          </p15:clr>
+        </p15:guide>
+      </p15:sldGuideLst>
+    </p:ext>
+  </p:extLst>
 </p:presentation>
 </file>
 
@@ -210,9 +226,7 @@
         </p:style>
         <p:txBody>
           <a:bodyPr anchor="ctr"/>
-          <a:lstStyle>
-            <a:extLst/>
-          </a:lstStyle>
+          <a:lstStyle/>
           <a:p>
             <a:pPr algn="ctr" eaLnBrk="1" latinLnBrk="0" hangingPunct="1"/>
             <a:endParaRPr kumimoji="0" lang="en-US"/>
@@ -251,9 +265,7 @@
         </p:spPr>
         <p:txBody>
           <a:bodyPr vert="horz" wrap="square" lIns="91440" tIns="45720" rIns="91440" bIns="45720" anchor="t" compatLnSpc="1"/>
-          <a:lstStyle>
-            <a:extLst/>
-          </a:lstStyle>
+          <a:lstStyle/>
           <a:p>
             <a:endParaRPr kumimoji="0" lang="en-US"/>
           </a:p>
@@ -287,10 +299,9 @@
           </a:lstStyle>
           <a:p>
             <a:r>
-              <a:rPr kumimoji="0" lang="en-US" smtClean="0"/>
+              <a:rPr kumimoji="0" lang="en-US"/>
               <a:t>Click to edit Master title style</a:t>
             </a:r>
-            <a:endParaRPr kumimoji="0" lang="en-US"/>
           </a:p>
         </p:txBody>
       </p:sp>
@@ -350,10 +361,9 @@
           </a:lstStyle>
           <a:p>
             <a:r>
-              <a:rPr kumimoji="0" lang="en-US" smtClean="0"/>
+              <a:rPr kumimoji="0" lang="en-US"/>
               <a:t>Click to edit Master subtitle style</a:t>
             </a:r>
-            <a:endParaRPr kumimoji="0" lang="en-US"/>
           </a:p>
         </p:txBody>
       </p:sp>
@@ -388,7 +398,7 @@
           <a:p>
             <a:fld id="{4AB6CA7C-B1B7-4FB0-B674-986843A93263}" type="datetimeFigureOut">
               <a:rPr lang="en-US" smtClean="0"/>
-              <a:t>3/8/2021</a:t>
+              <a:t>4/17/2021</a:t>
             </a:fld>
             <a:endParaRPr lang="en-US"/>
           </a:p>
@@ -502,92 +512,85 @@
         <p:spPr/>
         <p:txBody>
           <a:bodyPr/>
-          <a:lstStyle>
-            <a:extLst/>
-          </a:lstStyle>
-          <a:p>
-            <a:r>
-              <a:rPr kumimoji="0" lang="en-US" smtClean="0"/>
+          <a:lstStyle/>
+          <a:p>
+            <a:r>
+              <a:rPr kumimoji="0" lang="en-US"/>
               <a:t>Click to edit Master title style</a:t>
             </a:r>
+          </a:p>
+        </p:txBody>
+      </p:sp>
+      <p:sp>
+        <p:nvSpPr>
+          <p:cNvPr id="3" name="Vertical Text Placeholder 2"/>
+          <p:cNvSpPr>
+            <a:spLocks noGrp="1"/>
+          </p:cNvSpPr>
+          <p:nvPr>
+            <p:ph type="body" orient="vert" idx="1"/>
+          </p:nvPr>
+        </p:nvSpPr>
+        <p:spPr/>
+        <p:txBody>
+          <a:bodyPr vert="eaVert"/>
+          <a:lstStyle/>
+          <a:p>
+            <a:pPr lvl="0" eaLnBrk="1" latinLnBrk="0" hangingPunct="1"/>
+            <a:r>
+              <a:rPr lang="en-US"/>
+              <a:t>Click to edit Master text styles</a:t>
+            </a:r>
+          </a:p>
+          <a:p>
+            <a:pPr lvl="1" eaLnBrk="1" latinLnBrk="0" hangingPunct="1"/>
+            <a:r>
+              <a:rPr lang="en-US"/>
+              <a:t>Second level</a:t>
+            </a:r>
+          </a:p>
+          <a:p>
+            <a:pPr lvl="2" eaLnBrk="1" latinLnBrk="0" hangingPunct="1"/>
+            <a:r>
+              <a:rPr lang="en-US"/>
+              <a:t>Third level</a:t>
+            </a:r>
+          </a:p>
+          <a:p>
+            <a:pPr lvl="3" eaLnBrk="1" latinLnBrk="0" hangingPunct="1"/>
+            <a:r>
+              <a:rPr lang="en-US"/>
+              <a:t>Fourth level</a:t>
+            </a:r>
+          </a:p>
+          <a:p>
+            <a:pPr lvl="4" eaLnBrk="1" latinLnBrk="0" hangingPunct="1"/>
+            <a:r>
+              <a:rPr lang="en-US"/>
+              <a:t>Fifth level</a:t>
+            </a:r>
             <a:endParaRPr kumimoji="0" lang="en-US"/>
           </a:p>
         </p:txBody>
       </p:sp>
       <p:sp>
         <p:nvSpPr>
-          <p:cNvPr id="3" name="Vertical Text Placeholder 2"/>
-          <p:cNvSpPr>
-            <a:spLocks noGrp="1"/>
-          </p:cNvSpPr>
-          <p:nvPr>
-            <p:ph type="body" orient="vert" idx="1"/>
+          <p:cNvPr id="4" name="Date Placeholder 3"/>
+          <p:cNvSpPr>
+            <a:spLocks noGrp="1"/>
+          </p:cNvSpPr>
+          <p:nvPr>
+            <p:ph type="dt" sz="half" idx="10"/>
           </p:nvPr>
         </p:nvSpPr>
         <p:spPr/>
         <p:txBody>
-          <a:bodyPr vert="eaVert"/>
-          <a:lstStyle>
-            <a:extLst/>
-          </a:lstStyle>
-          <a:p>
-            <a:pPr lvl="0" eaLnBrk="1" latinLnBrk="0" hangingPunct="1"/>
-            <a:r>
-              <a:rPr lang="en-US" smtClean="0"/>
-              <a:t>Click to edit Master text styles</a:t>
-            </a:r>
-          </a:p>
-          <a:p>
-            <a:pPr lvl="1" eaLnBrk="1" latinLnBrk="0" hangingPunct="1"/>
-            <a:r>
-              <a:rPr lang="en-US" smtClean="0"/>
-              <a:t>Second level</a:t>
-            </a:r>
-          </a:p>
-          <a:p>
-            <a:pPr lvl="2" eaLnBrk="1" latinLnBrk="0" hangingPunct="1"/>
-            <a:r>
-              <a:rPr lang="en-US" smtClean="0"/>
-              <a:t>Third level</a:t>
-            </a:r>
-          </a:p>
-          <a:p>
-            <a:pPr lvl="3" eaLnBrk="1" latinLnBrk="0" hangingPunct="1"/>
-            <a:r>
-              <a:rPr lang="en-US" smtClean="0"/>
-              <a:t>Fourth level</a:t>
-            </a:r>
-          </a:p>
-          <a:p>
-            <a:pPr lvl="4" eaLnBrk="1" latinLnBrk="0" hangingPunct="1"/>
-            <a:r>
-              <a:rPr lang="en-US" smtClean="0"/>
-              <a:t>Fifth level</a:t>
-            </a:r>
-            <a:endParaRPr kumimoji="0" lang="en-US"/>
-          </a:p>
-        </p:txBody>
-      </p:sp>
-      <p:sp>
-        <p:nvSpPr>
-          <p:cNvPr id="4" name="Date Placeholder 3"/>
-          <p:cNvSpPr>
-            <a:spLocks noGrp="1"/>
-          </p:cNvSpPr>
-          <p:nvPr>
-            <p:ph type="dt" sz="half" idx="10"/>
-          </p:nvPr>
-        </p:nvSpPr>
-        <p:spPr/>
-        <p:txBody>
           <a:bodyPr/>
-          <a:lstStyle>
-            <a:extLst/>
-          </a:lstStyle>
+          <a:lstStyle/>
           <a:p>
             <a:fld id="{4AB6CA7C-B1B7-4FB0-B674-986843A93263}" type="datetimeFigureOut">
               <a:rPr lang="en-US" smtClean="0"/>
-              <a:t>3/8/2021</a:t>
+              <a:t>4/17/2021</a:t>
             </a:fld>
             <a:endParaRPr lang="en-US"/>
           </a:p>
@@ -606,9 +609,7 @@
         <p:spPr/>
         <p:txBody>
           <a:bodyPr/>
-          <a:lstStyle>
-            <a:extLst/>
-          </a:lstStyle>
+          <a:lstStyle/>
           <a:p>
             <a:endParaRPr lang="en-US"/>
           </a:p>
@@ -627,9 +628,7 @@
         <p:spPr/>
         <p:txBody>
           <a:bodyPr/>
-          <a:lstStyle>
-            <a:extLst/>
-          </a:lstStyle>
+          <a:lstStyle/>
           <a:p>
             <a:fld id="{30E61EF9-EFD5-4563-96FA-BBF19B0DED89}" type="slidenum">
               <a:rPr lang="en-US" smtClean="0"/>
@@ -682,15 +681,12 @@
         </p:spPr>
         <p:txBody>
           <a:bodyPr vert="eaVert" anchor="t"/>
-          <a:lstStyle>
-            <a:extLst/>
-          </a:lstStyle>
-          <a:p>
-            <a:r>
-              <a:rPr kumimoji="0" lang="en-US" smtClean="0"/>
+          <a:lstStyle/>
+          <a:p>
+            <a:r>
+              <a:rPr kumimoji="0" lang="en-US"/>
               <a:t>Click to edit Master title style</a:t>
             </a:r>
-            <a:endParaRPr kumimoji="0" lang="en-US"/>
           </a:p>
         </p:txBody>
       </p:sp>
@@ -712,41 +708,39 @@
         </p:spPr>
         <p:txBody>
           <a:bodyPr vert="eaVert"/>
-          <a:lstStyle>
-            <a:extLst/>
-          </a:lstStyle>
+          <a:lstStyle/>
           <a:p>
             <a:pPr lvl="0" eaLnBrk="1" latinLnBrk="0" hangingPunct="1"/>
             <a:r>
-              <a:rPr lang="en-US" smtClean="0"/>
+              <a:rPr lang="en-US"/>
               <a:t>Click to edit Master text styles</a:t>
             </a:r>
           </a:p>
           <a:p>
             <a:pPr lvl="1" eaLnBrk="1" latinLnBrk="0" hangingPunct="1"/>
             <a:r>
-              <a:rPr lang="en-US" smtClean="0"/>
+              <a:rPr lang="en-US"/>
               <a:t>Second level</a:t>
             </a:r>
           </a:p>
           <a:p>
             <a:pPr lvl="2" eaLnBrk="1" latinLnBrk="0" hangingPunct="1"/>
             <a:r>
-              <a:rPr lang="en-US" smtClean="0"/>
+              <a:rPr lang="en-US"/>
               <a:t>Third level</a:t>
             </a:r>
           </a:p>
           <a:p>
             <a:pPr lvl="3" eaLnBrk="1" latinLnBrk="0" hangingPunct="1"/>
             <a:r>
-              <a:rPr lang="en-US" smtClean="0"/>
+              <a:rPr lang="en-US"/>
               <a:t>Fourth level</a:t>
             </a:r>
           </a:p>
           <a:p>
             <a:pPr lvl="4" eaLnBrk="1" latinLnBrk="0" hangingPunct="1"/>
             <a:r>
-              <a:rPr lang="en-US" smtClean="0"/>
+              <a:rPr lang="en-US"/>
               <a:t>Fifth level</a:t>
             </a:r>
             <a:endParaRPr kumimoji="0" lang="en-US"/>
@@ -771,13 +765,11 @@
         </p:spPr>
         <p:txBody>
           <a:bodyPr/>
-          <a:lstStyle>
-            <a:extLst/>
-          </a:lstStyle>
+          <a:lstStyle/>
           <a:p>
             <a:fld id="{4AB6CA7C-B1B7-4FB0-B674-986843A93263}" type="datetimeFigureOut">
               <a:rPr lang="en-US" smtClean="0"/>
-              <a:t>3/8/2021</a:t>
+              <a:t>4/17/2021</a:t>
             </a:fld>
             <a:endParaRPr lang="en-US"/>
           </a:p>
@@ -801,9 +793,7 @@
         </p:spPr>
         <p:txBody>
           <a:bodyPr/>
-          <a:lstStyle>
-            <a:extLst/>
-          </a:lstStyle>
+          <a:lstStyle/>
           <a:p>
             <a:endParaRPr lang="en-US"/>
           </a:p>
@@ -884,92 +874,85 @@
         <p:spPr/>
         <p:txBody>
           <a:bodyPr/>
-          <a:lstStyle>
-            <a:extLst/>
-          </a:lstStyle>
-          <a:p>
-            <a:r>
-              <a:rPr kumimoji="0" lang="en-US" smtClean="0"/>
+          <a:lstStyle/>
+          <a:p>
+            <a:r>
+              <a:rPr kumimoji="0" lang="en-US"/>
               <a:t>Click to edit Master title style</a:t>
             </a:r>
+          </a:p>
+        </p:txBody>
+      </p:sp>
+      <p:sp>
+        <p:nvSpPr>
+          <p:cNvPr id="3" name="Content Placeholder 2"/>
+          <p:cNvSpPr>
+            <a:spLocks noGrp="1"/>
+          </p:cNvSpPr>
+          <p:nvPr>
+            <p:ph idx="1"/>
+          </p:nvPr>
+        </p:nvSpPr>
+        <p:spPr/>
+        <p:txBody>
+          <a:bodyPr/>
+          <a:lstStyle/>
+          <a:p>
+            <a:pPr lvl="0" eaLnBrk="1" latinLnBrk="0" hangingPunct="1"/>
+            <a:r>
+              <a:rPr lang="en-US"/>
+              <a:t>Click to edit Master text styles</a:t>
+            </a:r>
+          </a:p>
+          <a:p>
+            <a:pPr lvl="1" eaLnBrk="1" latinLnBrk="0" hangingPunct="1"/>
+            <a:r>
+              <a:rPr lang="en-US"/>
+              <a:t>Second level</a:t>
+            </a:r>
+          </a:p>
+          <a:p>
+            <a:pPr lvl="2" eaLnBrk="1" latinLnBrk="0" hangingPunct="1"/>
+            <a:r>
+              <a:rPr lang="en-US"/>
+              <a:t>Third level</a:t>
+            </a:r>
+          </a:p>
+          <a:p>
+            <a:pPr lvl="3" eaLnBrk="1" latinLnBrk="0" hangingPunct="1"/>
+            <a:r>
+              <a:rPr lang="en-US"/>
+              <a:t>Fourth level</a:t>
+            </a:r>
+          </a:p>
+          <a:p>
+            <a:pPr lvl="4" eaLnBrk="1" latinLnBrk="0" hangingPunct="1"/>
+            <a:r>
+              <a:rPr lang="en-US"/>
+              <a:t>Fifth level</a:t>
+            </a:r>
             <a:endParaRPr kumimoji="0" lang="en-US"/>
           </a:p>
         </p:txBody>
       </p:sp>
       <p:sp>
         <p:nvSpPr>
-          <p:cNvPr id="3" name="Content Placeholder 2"/>
-          <p:cNvSpPr>
-            <a:spLocks noGrp="1"/>
-          </p:cNvSpPr>
-          <p:nvPr>
-            <p:ph idx="1"/>
+          <p:cNvPr id="4" name="Date Placeholder 3"/>
+          <p:cNvSpPr>
+            <a:spLocks noGrp="1"/>
+          </p:cNvSpPr>
+          <p:nvPr>
+            <p:ph type="dt" sz="half" idx="10"/>
           </p:nvPr>
         </p:nvSpPr>
         <p:spPr/>
         <p:txBody>
           <a:bodyPr/>
-          <a:lstStyle>
-            <a:extLst/>
-          </a:lstStyle>
-          <a:p>
-            <a:pPr lvl="0" eaLnBrk="1" latinLnBrk="0" hangingPunct="1"/>
-            <a:r>
-              <a:rPr lang="en-US" smtClean="0"/>
-              <a:t>Click to edit Master text styles</a:t>
-            </a:r>
-          </a:p>
-          <a:p>
-            <a:pPr lvl="1" eaLnBrk="1" latinLnBrk="0" hangingPunct="1"/>
-            <a:r>
-              <a:rPr lang="en-US" smtClean="0"/>
-              <a:t>Second level</a:t>
-            </a:r>
-          </a:p>
-          <a:p>
-            <a:pPr lvl="2" eaLnBrk="1" latinLnBrk="0" hangingPunct="1"/>
-            <a:r>
-              <a:rPr lang="en-US" smtClean="0"/>
-              <a:t>Third level</a:t>
-            </a:r>
-          </a:p>
-          <a:p>
-            <a:pPr lvl="3" eaLnBrk="1" latinLnBrk="0" hangingPunct="1"/>
-            <a:r>
-              <a:rPr lang="en-US" smtClean="0"/>
-              <a:t>Fourth level</a:t>
-            </a:r>
-          </a:p>
-          <a:p>
-            <a:pPr lvl="4" eaLnBrk="1" latinLnBrk="0" hangingPunct="1"/>
-            <a:r>
-              <a:rPr lang="en-US" smtClean="0"/>
-              <a:t>Fifth level</a:t>
-            </a:r>
-            <a:endParaRPr kumimoji="0" lang="en-US"/>
-          </a:p>
-        </p:txBody>
-      </p:sp>
-      <p:sp>
-        <p:nvSpPr>
-          <p:cNvPr id="4" name="Date Placeholder 3"/>
-          <p:cNvSpPr>
-            <a:spLocks noGrp="1"/>
-          </p:cNvSpPr>
-          <p:nvPr>
-            <p:ph type="dt" sz="half" idx="10"/>
-          </p:nvPr>
-        </p:nvSpPr>
-        <p:spPr/>
-        <p:txBody>
-          <a:bodyPr/>
-          <a:lstStyle>
-            <a:extLst/>
-          </a:lstStyle>
+          <a:lstStyle/>
           <a:p>
             <a:fld id="{4AB6CA7C-B1B7-4FB0-B674-986843A93263}" type="datetimeFigureOut">
               <a:rPr lang="en-US" smtClean="0"/>
-              <a:t>3/8/2021</a:t>
+              <a:t>4/17/2021</a:t>
             </a:fld>
             <a:endParaRPr lang="en-US"/>
           </a:p>
@@ -988,9 +971,7 @@
         <p:spPr/>
         <p:txBody>
           <a:bodyPr/>
-          <a:lstStyle>
-            <a:extLst/>
-          </a:lstStyle>
+          <a:lstStyle/>
           <a:p>
             <a:endParaRPr lang="en-US"/>
           </a:p>
@@ -1009,9 +990,7 @@
         <p:spPr/>
         <p:txBody>
           <a:bodyPr/>
-          <a:lstStyle>
-            <a:extLst/>
-          </a:lstStyle>
+          <a:lstStyle/>
           <a:p>
             <a:fld id="{30E61EF9-EFD5-4563-96FA-BBF19B0DED89}" type="slidenum">
               <a:rPr lang="en-US" smtClean="0"/>
@@ -1078,10 +1057,9 @@
           </a:lstStyle>
           <a:p>
             <a:r>
-              <a:rPr kumimoji="0" lang="en-US" smtClean="0"/>
+              <a:rPr kumimoji="0" lang="en-US"/>
               <a:t>Click to edit Master title style</a:t>
             </a:r>
-            <a:endParaRPr kumimoji="0" lang="en-US"/>
           </a:p>
         </p:txBody>
       </p:sp>
@@ -1158,7 +1136,7 @@
           <a:p>
             <a:pPr lvl="0" eaLnBrk="1" latinLnBrk="0" hangingPunct="1"/>
             <a:r>
-              <a:rPr kumimoji="0" lang="en-US" smtClean="0"/>
+              <a:rPr kumimoji="0" lang="en-US"/>
               <a:t>Click to edit Master text styles</a:t>
             </a:r>
           </a:p>
@@ -1195,7 +1173,7 @@
           <a:p>
             <a:fld id="{4AB6CA7C-B1B7-4FB0-B674-986843A93263}" type="datetimeFigureOut">
               <a:rPr lang="en-US" smtClean="0"/>
-              <a:t>3/8/2021</a:t>
+              <a:t>4/17/2021</a:t>
             </a:fld>
             <a:endParaRPr lang="en-US"/>
           </a:p>
@@ -1252,9 +1230,7 @@
         </p:spPr>
         <p:txBody>
           <a:bodyPr/>
-          <a:lstStyle>
-            <a:extLst/>
-          </a:lstStyle>
+          <a:lstStyle/>
           <a:p>
             <a:fld id="{30E61EF9-EFD5-4563-96FA-BBF19B0DED89}" type="slidenum">
               <a:rPr lang="en-US" smtClean="0"/>
@@ -1307,15 +1283,12 @@
         </p:spPr>
         <p:txBody>
           <a:bodyPr/>
-          <a:lstStyle>
-            <a:extLst/>
-          </a:lstStyle>
-          <a:p>
-            <a:r>
-              <a:rPr kumimoji="0" lang="en-US" smtClean="0"/>
+          <a:lstStyle/>
+          <a:p>
+            <a:r>
+              <a:rPr kumimoji="0" lang="en-US"/>
               <a:t>Click to edit Master title style</a:t>
             </a:r>
-            <a:endParaRPr kumimoji="0" lang="en-US"/>
           </a:p>
         </p:txBody>
       </p:sp>
@@ -1358,35 +1331,35 @@
           <a:p>
             <a:pPr lvl="0" eaLnBrk="1" latinLnBrk="0" hangingPunct="1"/>
             <a:r>
-              <a:rPr lang="en-US" smtClean="0"/>
+              <a:rPr lang="en-US"/>
               <a:t>Click to edit Master text styles</a:t>
             </a:r>
           </a:p>
           <a:p>
             <a:pPr lvl="1" eaLnBrk="1" latinLnBrk="0" hangingPunct="1"/>
             <a:r>
-              <a:rPr lang="en-US" smtClean="0"/>
+              <a:rPr lang="en-US"/>
               <a:t>Second level</a:t>
             </a:r>
           </a:p>
           <a:p>
             <a:pPr lvl="2" eaLnBrk="1" latinLnBrk="0" hangingPunct="1"/>
             <a:r>
-              <a:rPr lang="en-US" smtClean="0"/>
+              <a:rPr lang="en-US"/>
               <a:t>Third level</a:t>
             </a:r>
           </a:p>
           <a:p>
             <a:pPr lvl="3" eaLnBrk="1" latinLnBrk="0" hangingPunct="1"/>
             <a:r>
-              <a:rPr lang="en-US" smtClean="0"/>
+              <a:rPr lang="en-US"/>
               <a:t>Fourth level</a:t>
             </a:r>
           </a:p>
           <a:p>
             <a:pPr lvl="4" eaLnBrk="1" latinLnBrk="0" hangingPunct="1"/>
             <a:r>
-              <a:rPr lang="en-US" smtClean="0"/>
+              <a:rPr lang="en-US"/>
               <a:t>Fifth level</a:t>
             </a:r>
             <a:endParaRPr kumimoji="0" lang="en-US"/>
@@ -1432,35 +1405,35 @@
           <a:p>
             <a:pPr lvl="0" eaLnBrk="1" latinLnBrk="0" hangingPunct="1"/>
             <a:r>
-              <a:rPr lang="en-US" smtClean="0"/>
+              <a:rPr lang="en-US"/>
               <a:t>Click to edit Master text styles</a:t>
             </a:r>
           </a:p>
           <a:p>
             <a:pPr lvl="1" eaLnBrk="1" latinLnBrk="0" hangingPunct="1"/>
             <a:r>
-              <a:rPr lang="en-US" smtClean="0"/>
+              <a:rPr lang="en-US"/>
               <a:t>Second level</a:t>
             </a:r>
           </a:p>
           <a:p>
             <a:pPr lvl="2" eaLnBrk="1" latinLnBrk="0" hangingPunct="1"/>
             <a:r>
-              <a:rPr lang="en-US" smtClean="0"/>
+              <a:rPr lang="en-US"/>
               <a:t>Third level</a:t>
             </a:r>
           </a:p>
           <a:p>
             <a:pPr lvl="3" eaLnBrk="1" latinLnBrk="0" hangingPunct="1"/>
             <a:r>
-              <a:rPr lang="en-US" smtClean="0"/>
+              <a:rPr lang="en-US"/>
               <a:t>Fourth level</a:t>
             </a:r>
           </a:p>
           <a:p>
             <a:pPr lvl="4" eaLnBrk="1" latinLnBrk="0" hangingPunct="1"/>
             <a:r>
-              <a:rPr lang="en-US" smtClean="0"/>
+              <a:rPr lang="en-US"/>
               <a:t>Fifth level</a:t>
             </a:r>
             <a:endParaRPr kumimoji="0" lang="en-US"/>
@@ -1480,13 +1453,11 @@
         <p:spPr/>
         <p:txBody>
           <a:bodyPr/>
-          <a:lstStyle>
-            <a:extLst/>
-          </a:lstStyle>
+          <a:lstStyle/>
           <a:p>
             <a:fld id="{4AB6CA7C-B1B7-4FB0-B674-986843A93263}" type="datetimeFigureOut">
               <a:rPr lang="en-US" smtClean="0"/>
-              <a:t>3/8/2021</a:t>
+              <a:t>4/17/2021</a:t>
             </a:fld>
             <a:endParaRPr lang="en-US"/>
           </a:p>
@@ -1505,9 +1476,7 @@
         <p:spPr/>
         <p:txBody>
           <a:bodyPr/>
-          <a:lstStyle>
-            <a:extLst/>
-          </a:lstStyle>
+          <a:lstStyle/>
           <a:p>
             <a:endParaRPr lang="en-US"/>
           </a:p>
@@ -1526,9 +1495,7 @@
         <p:spPr/>
         <p:txBody>
           <a:bodyPr/>
-          <a:lstStyle>
-            <a:extLst/>
-          </a:lstStyle>
+          <a:lstStyle/>
           <a:p>
             <a:fld id="{30E61EF9-EFD5-4563-96FA-BBF19B0DED89}" type="slidenum">
               <a:rPr lang="en-US" smtClean="0"/>
@@ -1589,10 +1556,9 @@
           </a:lstStyle>
           <a:p>
             <a:r>
-              <a:rPr kumimoji="0" lang="en-US" smtClean="0"/>
+              <a:rPr kumimoji="0" lang="en-US"/>
               <a:t>Click to edit Master title style</a:t>
             </a:r>
-            <a:endParaRPr kumimoji="0" lang="en-US"/>
           </a:p>
         </p:txBody>
       </p:sp>
@@ -1667,7 +1633,7 @@
           <a:p>
             <a:pPr lvl="0" eaLnBrk="1" latinLnBrk="0" hangingPunct="1"/>
             <a:r>
-              <a:rPr kumimoji="0" lang="en-US" smtClean="0"/>
+              <a:rPr kumimoji="0" lang="en-US"/>
               <a:t>Click to edit Master text styles</a:t>
             </a:r>
           </a:p>
@@ -1744,7 +1710,7 @@
           <a:p>
             <a:pPr lvl="0" eaLnBrk="1" latinLnBrk="0" hangingPunct="1"/>
             <a:r>
-              <a:rPr kumimoji="0" lang="en-US" smtClean="0"/>
+              <a:rPr kumimoji="0" lang="en-US"/>
               <a:t>Click to edit Master text styles</a:t>
             </a:r>
           </a:p>
@@ -1789,35 +1755,35 @@
           <a:p>
             <a:pPr lvl="0" eaLnBrk="1" latinLnBrk="0" hangingPunct="1"/>
             <a:r>
-              <a:rPr lang="en-US" smtClean="0"/>
+              <a:rPr lang="en-US"/>
               <a:t>Click to edit Master text styles</a:t>
             </a:r>
           </a:p>
           <a:p>
             <a:pPr lvl="1" eaLnBrk="1" latinLnBrk="0" hangingPunct="1"/>
             <a:r>
-              <a:rPr lang="en-US" smtClean="0"/>
+              <a:rPr lang="en-US"/>
               <a:t>Second level</a:t>
             </a:r>
           </a:p>
           <a:p>
             <a:pPr lvl="2" eaLnBrk="1" latinLnBrk="0" hangingPunct="1"/>
             <a:r>
-              <a:rPr lang="en-US" smtClean="0"/>
+              <a:rPr lang="en-US"/>
               <a:t>Third level</a:t>
             </a:r>
           </a:p>
           <a:p>
             <a:pPr lvl="3" eaLnBrk="1" latinLnBrk="0" hangingPunct="1"/>
             <a:r>
-              <a:rPr lang="en-US" smtClean="0"/>
+              <a:rPr lang="en-US"/>
               <a:t>Fourth level</a:t>
             </a:r>
           </a:p>
           <a:p>
             <a:pPr lvl="4" eaLnBrk="1" latinLnBrk="0" hangingPunct="1"/>
             <a:r>
-              <a:rPr lang="en-US" smtClean="0"/>
+              <a:rPr lang="en-US"/>
               <a:t>Fifth level</a:t>
             </a:r>
             <a:endParaRPr kumimoji="0" lang="en-US"/>
@@ -1863,35 +1829,35 @@
           <a:p>
             <a:pPr lvl="0" eaLnBrk="1" latinLnBrk="0" hangingPunct="1"/>
             <a:r>
-              <a:rPr lang="en-US" smtClean="0"/>
+              <a:rPr lang="en-US"/>
               <a:t>Click to edit Master text styles</a:t>
             </a:r>
           </a:p>
           <a:p>
             <a:pPr lvl="1" eaLnBrk="1" latinLnBrk="0" hangingPunct="1"/>
             <a:r>
-              <a:rPr lang="en-US" smtClean="0"/>
+              <a:rPr lang="en-US"/>
               <a:t>Second level</a:t>
             </a:r>
           </a:p>
           <a:p>
             <a:pPr lvl="2" eaLnBrk="1" latinLnBrk="0" hangingPunct="1"/>
             <a:r>
-              <a:rPr lang="en-US" smtClean="0"/>
+              <a:rPr lang="en-US"/>
               <a:t>Third level</a:t>
             </a:r>
           </a:p>
           <a:p>
             <a:pPr lvl="3" eaLnBrk="1" latinLnBrk="0" hangingPunct="1"/>
             <a:r>
-              <a:rPr lang="en-US" smtClean="0"/>
+              <a:rPr lang="en-US"/>
               <a:t>Fourth level</a:t>
             </a:r>
           </a:p>
           <a:p>
             <a:pPr lvl="4" eaLnBrk="1" latinLnBrk="0" hangingPunct="1"/>
             <a:r>
-              <a:rPr lang="en-US" smtClean="0"/>
+              <a:rPr lang="en-US"/>
               <a:t>Fifth level</a:t>
             </a:r>
             <a:endParaRPr kumimoji="0" lang="en-US"/>
@@ -1911,13 +1877,11 @@
         <p:spPr/>
         <p:txBody>
           <a:bodyPr/>
-          <a:lstStyle>
-            <a:extLst/>
-          </a:lstStyle>
+          <a:lstStyle/>
           <a:p>
             <a:fld id="{4AB6CA7C-B1B7-4FB0-B674-986843A93263}" type="datetimeFigureOut">
               <a:rPr lang="en-US" smtClean="0"/>
-              <a:t>3/8/2021</a:t>
+              <a:t>4/17/2021</a:t>
             </a:fld>
             <a:endParaRPr lang="en-US"/>
           </a:p>
@@ -1936,9 +1900,7 @@
         <p:spPr/>
         <p:txBody>
           <a:bodyPr/>
-          <a:lstStyle>
-            <a:extLst/>
-          </a:lstStyle>
+          <a:lstStyle/>
           <a:p>
             <a:endParaRPr lang="en-US"/>
           </a:p>
@@ -1957,9 +1919,7 @@
         <p:spPr/>
         <p:txBody>
           <a:bodyPr/>
-          <a:lstStyle>
-            <a:extLst/>
-          </a:lstStyle>
+          <a:lstStyle/>
           <a:p>
             <a:fld id="{30E61EF9-EFD5-4563-96FA-BBF19B0DED89}" type="slidenum">
               <a:rPr lang="en-US" smtClean="0"/>
@@ -2012,15 +1972,12 @@
         </p:spPr>
         <p:txBody>
           <a:bodyPr/>
-          <a:lstStyle>
-            <a:extLst/>
-          </a:lstStyle>
-          <a:p>
-            <a:r>
-              <a:rPr kumimoji="0" lang="en-US" smtClean="0"/>
+          <a:lstStyle/>
+          <a:p>
+            <a:r>
+              <a:rPr kumimoji="0" lang="en-US"/>
               <a:t>Click to edit Master title style</a:t>
             </a:r>
-            <a:endParaRPr kumimoji="0" lang="en-US"/>
           </a:p>
         </p:txBody>
       </p:sp>
@@ -2037,13 +1994,11 @@
         <p:spPr/>
         <p:txBody>
           <a:bodyPr/>
-          <a:lstStyle>
-            <a:extLst/>
-          </a:lstStyle>
+          <a:lstStyle/>
           <a:p>
             <a:fld id="{4AB6CA7C-B1B7-4FB0-B674-986843A93263}" type="datetimeFigureOut">
               <a:rPr lang="en-US" smtClean="0"/>
-              <a:t>3/8/2021</a:t>
+              <a:t>4/17/2021</a:t>
             </a:fld>
             <a:endParaRPr lang="en-US"/>
           </a:p>
@@ -2062,9 +2017,7 @@
         <p:spPr/>
         <p:txBody>
           <a:bodyPr/>
-          <a:lstStyle>
-            <a:extLst/>
-          </a:lstStyle>
+          <a:lstStyle/>
           <a:p>
             <a:endParaRPr lang="en-US"/>
           </a:p>
@@ -2083,9 +2036,7 @@
         <p:spPr/>
         <p:txBody>
           <a:bodyPr/>
-          <a:lstStyle>
-            <a:extLst/>
-          </a:lstStyle>
+          <a:lstStyle/>
           <a:p>
             <a:fld id="{30E61EF9-EFD5-4563-96FA-BBF19B0DED89}" type="slidenum">
               <a:rPr lang="en-US" smtClean="0"/>
@@ -2146,7 +2097,7 @@
           <a:p>
             <a:fld id="{4AB6CA7C-B1B7-4FB0-B674-986843A93263}" type="datetimeFigureOut">
               <a:rPr lang="en-US" smtClean="0"/>
-              <a:t>3/8/2021</a:t>
+              <a:t>4/17/2021</a:t>
             </a:fld>
             <a:endParaRPr lang="en-US"/>
           </a:p>
@@ -2193,9 +2144,7 @@
         <p:spPr/>
         <p:txBody>
           <a:bodyPr/>
-          <a:lstStyle>
-            <a:extLst/>
-          </a:lstStyle>
+          <a:lstStyle/>
           <a:p>
             <a:fld id="{30E61EF9-EFD5-4563-96FA-BBF19B0DED89}" type="slidenum">
               <a:rPr lang="en-US" smtClean="0"/>
@@ -2257,10 +2206,9 @@
           </a:lstStyle>
           <a:p>
             <a:r>
-              <a:rPr kumimoji="0" lang="en-US" smtClean="0"/>
+              <a:rPr kumimoji="0" lang="en-US"/>
               <a:t>Click to edit Master title style</a:t>
             </a:r>
-            <a:endParaRPr kumimoji="0" lang="en-US"/>
           </a:p>
         </p:txBody>
       </p:sp>
@@ -2316,7 +2264,7 @@
           <a:p>
             <a:pPr lvl="0" eaLnBrk="1" latinLnBrk="0" hangingPunct="1"/>
             <a:r>
-              <a:rPr kumimoji="0" lang="en-US" smtClean="0"/>
+              <a:rPr kumimoji="0" lang="en-US"/>
               <a:t>Click to edit Master text styles</a:t>
             </a:r>
           </a:p>
@@ -2361,35 +2309,35 @@
           <a:p>
             <a:pPr lvl="0" eaLnBrk="1" latinLnBrk="0" hangingPunct="1"/>
             <a:r>
-              <a:rPr lang="en-US" smtClean="0"/>
+              <a:rPr lang="en-US"/>
               <a:t>Click to edit Master text styles</a:t>
             </a:r>
           </a:p>
           <a:p>
             <a:pPr lvl="1" eaLnBrk="1" latinLnBrk="0" hangingPunct="1"/>
             <a:r>
-              <a:rPr lang="en-US" smtClean="0"/>
+              <a:rPr lang="en-US"/>
               <a:t>Second level</a:t>
             </a:r>
           </a:p>
           <a:p>
             <a:pPr lvl="2" eaLnBrk="1" latinLnBrk="0" hangingPunct="1"/>
             <a:r>
-              <a:rPr lang="en-US" smtClean="0"/>
+              <a:rPr lang="en-US"/>
               <a:t>Third level</a:t>
             </a:r>
           </a:p>
           <a:p>
             <a:pPr lvl="3" eaLnBrk="1" latinLnBrk="0" hangingPunct="1"/>
             <a:r>
-              <a:rPr lang="en-US" smtClean="0"/>
+              <a:rPr lang="en-US"/>
               <a:t>Fourth level</a:t>
             </a:r>
           </a:p>
           <a:p>
             <a:pPr lvl="4" eaLnBrk="1" latinLnBrk="0" hangingPunct="1"/>
             <a:r>
-              <a:rPr lang="en-US" smtClean="0"/>
+              <a:rPr lang="en-US"/>
               <a:t>Fifth level</a:t>
             </a:r>
             <a:endParaRPr kumimoji="0" lang="en-US"/>
@@ -2409,13 +2357,11 @@
         <p:spPr/>
         <p:txBody>
           <a:bodyPr/>
-          <a:lstStyle>
-            <a:extLst/>
-          </a:lstStyle>
+          <a:lstStyle/>
           <a:p>
             <a:fld id="{4AB6CA7C-B1B7-4FB0-B674-986843A93263}" type="datetimeFigureOut">
               <a:rPr lang="en-US" smtClean="0"/>
-              <a:t>3/8/2021</a:t>
+              <a:t>4/17/2021</a:t>
             </a:fld>
             <a:endParaRPr lang="en-US"/>
           </a:p>
@@ -2434,9 +2380,7 @@
         <p:spPr/>
         <p:txBody>
           <a:bodyPr/>
-          <a:lstStyle>
-            <a:extLst/>
-          </a:lstStyle>
+          <a:lstStyle/>
           <a:p>
             <a:endParaRPr lang="en-US"/>
           </a:p>
@@ -2455,9 +2399,7 @@
         <p:spPr/>
         <p:txBody>
           <a:bodyPr/>
-          <a:lstStyle>
-            <a:extLst/>
-          </a:lstStyle>
+          <a:lstStyle/>
           <a:p>
             <a:fld id="{30E61EF9-EFD5-4563-96FA-BBF19B0DED89}" type="slidenum">
               <a:rPr lang="en-US" smtClean="0"/>
@@ -2544,9 +2486,7 @@
         </p:style>
         <p:txBody>
           <a:bodyPr rtlCol="0" anchor="ctr"/>
-          <a:lstStyle>
-            <a:extLst/>
-          </a:lstStyle>
+          <a:lstStyle/>
           <a:p>
             <a:pPr algn="ctr" eaLnBrk="1" latinLnBrk="0" hangingPunct="1"/>
             <a:endParaRPr kumimoji="0" lang="en-US"/>
@@ -2600,9 +2540,7 @@
         </p:style>
         <p:txBody>
           <a:bodyPr rtlCol="0" anchor="ctr"/>
-          <a:lstStyle>
-            <a:extLst/>
-          </a:lstStyle>
+          <a:lstStyle/>
           <a:p>
             <a:pPr algn="ctr" eaLnBrk="1" latinLnBrk="0" hangingPunct="1"/>
             <a:endParaRPr kumimoji="0" lang="en-US"/>
@@ -2676,7 +2614,7 @@
           </a:lstStyle>
           <a:p>
             <a:r>
-              <a:rPr kumimoji="0" lang="en-US" smtClean="0"/>
+              <a:rPr kumimoji="0" lang="en-US"/>
               <a:t>Click to edit Master title style</a:t>
             </a:r>
             <a:endParaRPr kumimoji="0" lang="en-US" dirty="0"/>
@@ -2754,7 +2692,7 @@
               <a:defRPr/>
             </a:pPr>
             <a:r>
-              <a:rPr kumimoji="0" lang="en-US" smtClean="0"/>
+              <a:rPr kumimoji="0" lang="en-US"/>
               <a:t>Click to edit Master text styles</a:t>
             </a:r>
           </a:p>
@@ -2773,13 +2711,11 @@
         <p:spPr/>
         <p:txBody>
           <a:bodyPr/>
-          <a:lstStyle>
-            <a:extLst/>
-          </a:lstStyle>
+          <a:lstStyle/>
           <a:p>
             <a:fld id="{4AB6CA7C-B1B7-4FB0-B674-986843A93263}" type="datetimeFigureOut">
               <a:rPr lang="en-US" smtClean="0"/>
-              <a:t>3/8/2021</a:t>
+              <a:t>4/17/2021</a:t>
             </a:fld>
             <a:endParaRPr lang="en-US"/>
           </a:p>
@@ -2798,9 +2734,7 @@
         <p:spPr/>
         <p:txBody>
           <a:bodyPr/>
-          <a:lstStyle>
-            <a:extLst/>
-          </a:lstStyle>
+          <a:lstStyle/>
           <a:p>
             <a:endParaRPr lang="en-US"/>
           </a:p>
@@ -2819,9 +2753,7 @@
         <p:spPr/>
         <p:txBody>
           <a:bodyPr/>
-          <a:lstStyle>
-            <a:extLst/>
-          </a:lstStyle>
+          <a:lstStyle/>
           <a:p>
             <a:fld id="{30E61EF9-EFD5-4563-96FA-BBF19B0DED89}" type="slidenum">
               <a:rPr lang="en-US" smtClean="0"/>
@@ -2885,7 +2817,7 @@
           </a:lstStyle>
           <a:p>
             <a:r>
-              <a:rPr kumimoji="0" lang="en-US" smtClean="0"/>
+              <a:rPr kumimoji="0" lang="en-US"/>
               <a:t>Click icon to add picture</a:t>
             </a:r>
             <a:endParaRPr kumimoji="0" lang="en-US" dirty="0"/>
@@ -2992,9 +2924,7 @@
         </p:style>
         <p:txBody>
           <a:bodyPr anchor="ctr"/>
-          <a:lstStyle>
-            <a:extLst/>
-          </a:lstStyle>
+          <a:lstStyle/>
           <a:p>
             <a:pPr algn="ctr" eaLnBrk="1" latinLnBrk="0" hangingPunct="1"/>
             <a:endParaRPr kumimoji="0" lang="en-US"/>
@@ -3024,15 +2954,12 @@
           <a:bodyPr vert="horz" lIns="45720" tIns="0" rIns="45720" bIns="0" anchor="b" anchorCtr="0">
             <a:normAutofit/>
           </a:bodyPr>
-          <a:lstStyle>
-            <a:extLst/>
-          </a:lstStyle>
-          <a:p>
-            <a:r>
-              <a:rPr kumimoji="0" lang="en-US" smtClean="0"/>
+          <a:lstStyle/>
+          <a:p>
+            <a:r>
+              <a:rPr kumimoji="0" lang="en-US"/>
               <a:t>Click to edit Master title style</a:t>
             </a:r>
-            <a:endParaRPr kumimoji="0" lang="en-US"/>
           </a:p>
         </p:txBody>
       </p:sp>
@@ -3059,44 +2986,41 @@
           <a:bodyPr vert="horz">
             <a:normAutofit/>
           </a:bodyPr>
-          <a:lstStyle>
-            <a:extLst/>
-          </a:lstStyle>
+          <a:lstStyle/>
           <a:p>
             <a:pPr lvl="0" eaLnBrk="1" latinLnBrk="0" hangingPunct="1"/>
             <a:r>
-              <a:rPr kumimoji="0" lang="en-US" smtClean="0"/>
+              <a:rPr kumimoji="0" lang="en-US"/>
               <a:t>Click to edit Master text styles</a:t>
             </a:r>
           </a:p>
           <a:p>
             <a:pPr lvl="1" eaLnBrk="1" latinLnBrk="0" hangingPunct="1"/>
             <a:r>
-              <a:rPr kumimoji="0" lang="en-US" smtClean="0"/>
+              <a:rPr kumimoji="0" lang="en-US"/>
               <a:t>Second level</a:t>
             </a:r>
           </a:p>
           <a:p>
             <a:pPr lvl="2" eaLnBrk="1" latinLnBrk="0" hangingPunct="1"/>
             <a:r>
-              <a:rPr kumimoji="0" lang="en-US" smtClean="0"/>
+              <a:rPr kumimoji="0" lang="en-US"/>
               <a:t>Third level</a:t>
             </a:r>
           </a:p>
           <a:p>
             <a:pPr lvl="3" eaLnBrk="1" latinLnBrk="0" hangingPunct="1"/>
             <a:r>
-              <a:rPr kumimoji="0" lang="en-US" smtClean="0"/>
+              <a:rPr kumimoji="0" lang="en-US"/>
               <a:t>Fourth level</a:t>
             </a:r>
           </a:p>
           <a:p>
             <a:pPr lvl="4" eaLnBrk="1" latinLnBrk="0" hangingPunct="1"/>
             <a:r>
-              <a:rPr kumimoji="0" lang="en-US" smtClean="0"/>
+              <a:rPr kumimoji="0" lang="en-US"/>
               <a:t>Fifth level</a:t>
             </a:r>
-            <a:endParaRPr kumimoji="0" lang="en-US"/>
           </a:p>
         </p:txBody>
       </p:sp>
@@ -3134,7 +3058,7 @@
           <a:p>
             <a:fld id="{4AB6CA7C-B1B7-4FB0-B674-986843A93263}" type="datetimeFigureOut">
               <a:rPr lang="en-US" smtClean="0"/>
-              <a:t>3/8/2021</a:t>
+              <a:t>4/17/2021</a:t>
             </a:fld>
             <a:endParaRPr lang="en-US"/>
           </a:p>
@@ -3596,12 +3520,8 @@
           <a:bodyPr/>
           <a:lstStyle/>
           <a:p>
-            <a:r>
-              <a:rPr lang="bg-BG" dirty="0" smtClean="0"/>
-              <a:t/>
-            </a:r>
             <a:br>
-              <a:rPr lang="bg-BG" dirty="0" smtClean="0"/>
+              <a:rPr lang="bg-BG" dirty="0"/>
             </a:br>
             <a:endParaRPr lang="en-US" dirty="0"/>
           </a:p>
@@ -3622,7 +3542,7 @@
           <a:bodyPr/>
           <a:lstStyle/>
           <a:p>
-            <a:endParaRPr lang="bg-BG" dirty="0" smtClean="0"/>
+            <a:endParaRPr lang="bg-BG" dirty="0"/>
           </a:p>
           <a:p>
             <a:endParaRPr lang="en-US" dirty="0"/>
@@ -3653,7 +3573,7 @@
           <a:p>
             <a:pPr algn="ctr"/>
             <a:r>
-              <a:rPr lang="bg-BG" sz="5400" b="1" dirty="0" smtClean="0">
+              <a:rPr lang="bg-BG" sz="5400" b="1" dirty="0">
                 <a:ln w="17780" cmpd="sng">
                   <a:solidFill>
                     <a:srgbClr val="FFFFFF"/>
@@ -3809,12 +3729,8 @@
           </a:bodyPr>
           <a:lstStyle/>
           <a:p>
-            <a:r>
-              <a:rPr lang="bg-BG" dirty="0" smtClean="0"/>
-              <a:t/>
-            </a:r>
             <a:br>
-              <a:rPr lang="bg-BG" dirty="0" smtClean="0"/>
+              <a:rPr lang="bg-BG" dirty="0"/>
             </a:br>
             <a:endParaRPr lang="en-US" dirty="0"/>
           </a:p>
@@ -3838,7 +3754,7 @@
             <a:pPr marL="0" indent="0">
               <a:buNone/>
             </a:pPr>
-            <a:endParaRPr lang="bg-BG" dirty="0" smtClean="0"/>
+            <a:endParaRPr lang="bg-BG" dirty="0"/>
           </a:p>
           <a:p>
             <a:pPr marL="0" indent="0">
@@ -3871,7 +3787,7 @@
           <a:lstStyle/>
           <a:p>
             <a:r>
-              <a:rPr lang="bg-BG" dirty="0" smtClean="0"/>
+              <a:rPr lang="bg-BG" dirty="0"/>
               <a:t>-Сеизмонастии могат да възникнат при разтърсване на цялото растение, причиняват се от вятър, дъжд или допир. Това са бързи тургорни движения, които се наблюдават при листата на мимозата и насекомоядните растения</a:t>
             </a:r>
             <a:endParaRPr lang="en-US" dirty="0"/>
@@ -4007,12 +3923,8 @@
           </a:bodyPr>
           <a:lstStyle/>
           <a:p>
-            <a:r>
-              <a:rPr lang="bg-BG" dirty="0" smtClean="0"/>
-              <a:t/>
-            </a:r>
             <a:br>
-              <a:rPr lang="bg-BG" dirty="0" smtClean="0"/>
+              <a:rPr lang="bg-BG" dirty="0"/>
             </a:br>
             <a:endParaRPr lang="en-US" dirty="0"/>
           </a:p>
@@ -4036,7 +3948,7 @@
             <a:pPr marL="0" indent="0">
               <a:buNone/>
             </a:pPr>
-            <a:endParaRPr lang="bg-BG" dirty="0" smtClean="0"/>
+            <a:endParaRPr lang="bg-BG" dirty="0"/>
           </a:p>
           <a:p>
             <a:pPr marL="0" indent="0">
@@ -4069,27 +3981,27 @@
           <a:lstStyle/>
           <a:p>
             <a:r>
-              <a:rPr lang="bg-BG" dirty="0" smtClean="0"/>
+              <a:rPr lang="bg-BG" dirty="0"/>
               <a:t>В</a:t>
             </a:r>
             <a:r>
-              <a:rPr lang="en-US" dirty="0" smtClean="0"/>
+              <a:rPr lang="en-US" dirty="0"/>
               <a:t>)</a:t>
             </a:r>
             <a:r>
-              <a:rPr lang="bg-BG" dirty="0" smtClean="0"/>
+              <a:rPr lang="bg-BG" dirty="0"/>
               <a:t>Таксиси</a:t>
             </a:r>
           </a:p>
           <a:p>
             <a:r>
-              <a:rPr lang="bg-BG" dirty="0" smtClean="0"/>
+              <a:rPr lang="bg-BG" dirty="0"/>
               <a:t>-Фототаксиси се наблюдават при едноклетъчни еукариотни със самостойно хранене</a:t>
             </a:r>
           </a:p>
           <a:p>
             <a:r>
-              <a:rPr lang="bg-BG" dirty="0" smtClean="0"/>
+              <a:rPr lang="bg-BG" dirty="0"/>
               <a:t>-Хемотаксиси проявяват хетеротрофните едноклетъчни организми. Значението им е свързано с търсене на храна или на клетки от другия пол. </a:t>
             </a:r>
             <a:endParaRPr lang="en-US" dirty="0"/>
@@ -4184,12 +4096,8 @@
           </a:bodyPr>
           <a:lstStyle/>
           <a:p>
-            <a:r>
-              <a:rPr lang="bg-BG" dirty="0" smtClean="0"/>
-              <a:t/>
-            </a:r>
             <a:br>
-              <a:rPr lang="bg-BG" dirty="0" smtClean="0"/>
+              <a:rPr lang="bg-BG" dirty="0"/>
             </a:br>
             <a:endParaRPr lang="en-US" dirty="0"/>
           </a:p>
@@ -4213,7 +4121,7 @@
             <a:pPr marL="0" indent="0">
               <a:buNone/>
             </a:pPr>
-            <a:endParaRPr lang="bg-BG" dirty="0" smtClean="0"/>
+            <a:endParaRPr lang="bg-BG" dirty="0"/>
           </a:p>
           <a:p>
             <a:pPr marL="0" indent="0">
@@ -4261,7 +4169,7 @@
           <a:p>
             <a:pPr algn="ctr"/>
             <a:r>
-              <a:rPr lang="bg-BG" sz="4000" b="1" cap="none" spc="0" dirty="0" smtClean="0">
+              <a:rPr lang="bg-BG" sz="4000" b="1" cap="none" spc="0" dirty="0">
                 <a:ln w="11430"/>
                 <a:gradFill>
                   <a:gsLst>
@@ -4359,47 +4267,47 @@
           <a:lstStyle/>
           <a:p>
             <a:r>
-              <a:rPr lang="bg-BG" dirty="0" smtClean="0"/>
+              <a:rPr lang="bg-BG" dirty="0"/>
               <a:t>-Растежни движения, които не са предизвикани от действието на външни дразнители. Спадат локомоторни движения, растежни движения и други. </a:t>
             </a:r>
           </a:p>
           <a:p>
             <a:r>
-              <a:rPr lang="bg-BG" dirty="0" smtClean="0"/>
+              <a:rPr lang="bg-BG" dirty="0"/>
               <a:t>А</a:t>
             </a:r>
             <a:r>
-              <a:rPr lang="en-US" dirty="0" smtClean="0"/>
+              <a:rPr lang="en-US" dirty="0"/>
               <a:t>)</a:t>
             </a:r>
             <a:r>
-              <a:rPr lang="bg-BG" dirty="0" smtClean="0"/>
+              <a:rPr lang="bg-BG" dirty="0"/>
               <a:t>Локомоция представлява свободно, спонтанно придвижване на целия растителен организъм, на отделен орган или на клетъчно съдържимо</a:t>
             </a:r>
           </a:p>
           <a:p>
             <a:r>
-              <a:rPr lang="bg-BG" dirty="0" smtClean="0"/>
+              <a:rPr lang="bg-BG" dirty="0"/>
               <a:t>Б</a:t>
             </a:r>
             <a:r>
-              <a:rPr lang="en-US" dirty="0" smtClean="0"/>
+              <a:rPr lang="en-US" dirty="0"/>
               <a:t>)</a:t>
             </a:r>
             <a:r>
-              <a:rPr lang="bg-BG" dirty="0" smtClean="0"/>
+              <a:rPr lang="bg-BG" dirty="0"/>
               <a:t>Растежни движения-нутациите и настиите</a:t>
             </a:r>
           </a:p>
           <a:p>
             <a:r>
-              <a:rPr lang="bg-BG" dirty="0" smtClean="0"/>
+              <a:rPr lang="bg-BG" dirty="0"/>
               <a:t>-Нутации извършват стъблата и корените на растенията. Например стъблото не расте право нагоре, а извършва ритмични движения. Най-ясно изразени нутации има при увивните растения</a:t>
             </a:r>
           </a:p>
           <a:p>
             <a:r>
-              <a:rPr lang="bg-BG" smtClean="0"/>
+              <a:rPr lang="bg-BG"/>
               <a:t>-Настични движения-листата в повечето растения са разположени под определен ъгъл спрямо стъблата, който се определя от различната скорост на растеж на двете страни</a:t>
             </a:r>
             <a:endParaRPr lang="en-US"/>
@@ -4453,12 +4361,8 @@
           </a:bodyPr>
           <a:lstStyle/>
           <a:p>
-            <a:r>
-              <a:rPr lang="bg-BG" dirty="0" smtClean="0"/>
-              <a:t/>
-            </a:r>
             <a:br>
-              <a:rPr lang="bg-BG" dirty="0" smtClean="0"/>
+              <a:rPr lang="bg-BG" dirty="0"/>
             </a:br>
             <a:endParaRPr lang="en-US" dirty="0"/>
           </a:p>
@@ -4482,7 +4386,7 @@
             <a:pPr marL="0" indent="0">
               <a:buNone/>
             </a:pPr>
-            <a:endParaRPr lang="bg-BG" dirty="0" smtClean="0"/>
+            <a:endParaRPr lang="bg-BG" dirty="0"/>
           </a:p>
           <a:p>
             <a:pPr marL="0" indent="0">
@@ -4530,7 +4434,7 @@
           <a:p>
             <a:pPr algn="ctr"/>
             <a:r>
-              <a:rPr lang="bg-BG" sz="4000" b="1" cap="none" spc="50" dirty="0" smtClean="0">
+              <a:rPr lang="bg-BG" sz="4000" b="1" cap="none" spc="50" dirty="0">
                 <a:ln w="11430"/>
                 <a:gradFill>
                   <a:gsLst>
@@ -4596,70 +4500,70 @@
           <a:lstStyle/>
           <a:p>
             <a:r>
-              <a:rPr lang="bg-BG" dirty="0" smtClean="0"/>
+              <a:rPr lang="bg-BG" dirty="0"/>
               <a:t>А</a:t>
             </a:r>
             <a:r>
-              <a:rPr lang="en-US" dirty="0" smtClean="0"/>
+              <a:rPr lang="en-US" dirty="0"/>
               <a:t>)</a:t>
             </a:r>
             <a:r>
-              <a:rPr lang="bg-BG" dirty="0" smtClean="0"/>
+              <a:rPr lang="bg-BG" dirty="0"/>
               <a:t>При растенията движенията са слабо изразени. Осъществяват се през целия период на развитие на растенията </a:t>
             </a:r>
           </a:p>
           <a:p>
             <a:r>
-              <a:rPr lang="bg-BG" dirty="0" smtClean="0"/>
+              <a:rPr lang="bg-BG" dirty="0"/>
               <a:t>Б</a:t>
             </a:r>
             <a:r>
-              <a:rPr lang="en-US" dirty="0" smtClean="0"/>
+              <a:rPr lang="en-US" dirty="0"/>
               <a:t>)</a:t>
             </a:r>
             <a:r>
-              <a:rPr lang="bg-BG" dirty="0" smtClean="0"/>
+              <a:rPr lang="bg-BG" dirty="0"/>
               <a:t>Движенията при растенията могат да бъдат:</a:t>
             </a:r>
           </a:p>
           <a:p>
             <a:r>
-              <a:rPr lang="bg-BG" dirty="0" smtClean="0"/>
+              <a:rPr lang="bg-BG" dirty="0"/>
               <a:t>-индуцирани- когато настъпват под влиянието на външни фактори</a:t>
             </a:r>
             <a:r>
-              <a:rPr lang="en-US" dirty="0" smtClean="0"/>
+              <a:rPr lang="en-US" dirty="0"/>
               <a:t>(</a:t>
             </a:r>
             <a:r>
-              <a:rPr lang="bg-BG" dirty="0" smtClean="0"/>
+              <a:rPr lang="bg-BG" dirty="0"/>
               <a:t>светлина, земно притегляне и др.</a:t>
             </a:r>
             <a:r>
-              <a:rPr lang="en-US" dirty="0" smtClean="0"/>
+              <a:rPr lang="en-US" dirty="0"/>
               <a:t>)</a:t>
             </a:r>
-            <a:endParaRPr lang="bg-BG" dirty="0" smtClean="0"/>
-          </a:p>
-          <a:p>
-            <a:r>
-              <a:rPr lang="bg-BG" dirty="0" smtClean="0"/>
+            <a:endParaRPr lang="bg-BG" dirty="0"/>
+          </a:p>
+          <a:p>
+            <a:r>
+              <a:rPr lang="bg-BG" dirty="0"/>
               <a:t>-автономни</a:t>
             </a:r>
             <a:r>
-              <a:rPr lang="en-US" dirty="0" smtClean="0"/>
+              <a:rPr lang="en-US" dirty="0"/>
               <a:t>(</a:t>
             </a:r>
             <a:r>
-              <a:rPr lang="bg-BG" dirty="0" smtClean="0"/>
+              <a:rPr lang="bg-BG" dirty="0"/>
               <a:t>ендогенни</a:t>
             </a:r>
             <a:r>
-              <a:rPr lang="en-US" dirty="0" smtClean="0"/>
+              <a:rPr lang="en-US" dirty="0"/>
               <a:t>)</a:t>
             </a:r>
             <a:r>
-              <a:rPr lang="bg-BG" dirty="0" smtClean="0"/>
+              <a:rPr lang="bg-BG" dirty="0"/>
               <a:t>-когато се дължат на вътрешни причини</a:t>
             </a:r>
             <a:endParaRPr lang="en-US" dirty="0"/>
@@ -4713,12 +4617,8 @@
           </a:bodyPr>
           <a:lstStyle/>
           <a:p>
-            <a:r>
-              <a:rPr lang="bg-BG" dirty="0" smtClean="0"/>
-              <a:t/>
-            </a:r>
             <a:br>
-              <a:rPr lang="bg-BG" dirty="0" smtClean="0"/>
+              <a:rPr lang="bg-BG" dirty="0"/>
             </a:br>
             <a:endParaRPr lang="en-US" dirty="0"/>
           </a:p>
@@ -4742,7 +4642,7 @@
             <a:pPr marL="0" indent="0">
               <a:buNone/>
             </a:pPr>
-            <a:endParaRPr lang="bg-BG" dirty="0" smtClean="0"/>
+            <a:endParaRPr lang="bg-BG" dirty="0"/>
           </a:p>
           <a:p>
             <a:pPr marL="0" indent="0">
@@ -4856,33 +4756,33 @@
           <a:lstStyle/>
           <a:p>
             <a:r>
-              <a:rPr lang="bg-BG" dirty="0" smtClean="0"/>
+              <a:rPr lang="bg-BG" dirty="0"/>
               <a:t>А</a:t>
             </a:r>
             <a:r>
-              <a:rPr lang="en-US" dirty="0" smtClean="0"/>
+              <a:rPr lang="en-US" dirty="0"/>
               <a:t>)</a:t>
             </a:r>
             <a:r>
-              <a:rPr lang="bg-BG" dirty="0" smtClean="0"/>
+              <a:rPr lang="bg-BG" dirty="0"/>
               <a:t> Видове:</a:t>
             </a:r>
           </a:p>
           <a:p>
             <a:r>
-              <a:rPr lang="bg-BG" dirty="0" smtClean="0"/>
+              <a:rPr lang="bg-BG" dirty="0"/>
               <a:t>-тропизъм- растежно движение на растението в отговор на едностранно действащ дразнител</a:t>
             </a:r>
           </a:p>
           <a:p>
             <a:r>
-              <a:rPr lang="bg-BG" dirty="0" smtClean="0"/>
+              <a:rPr lang="bg-BG" dirty="0"/>
               <a:t>-настия-движения на органи с двустранна симетрия, причинени от дифузно действащ дразнител</a:t>
             </a:r>
           </a:p>
           <a:p>
             <a:r>
-              <a:rPr lang="bg-BG" dirty="0" smtClean="0"/>
+              <a:rPr lang="bg-BG" dirty="0"/>
               <a:t>-таксис- свободно движение на едноклетъчни организми или полови клетки по посока на дразнител</a:t>
             </a:r>
           </a:p>
@@ -4891,7 +4791,7 @@
           </a:p>
           <a:p>
             <a:r>
-              <a:rPr lang="bg-BG" dirty="0" smtClean="0"/>
+              <a:rPr lang="bg-BG" dirty="0"/>
               <a:t>Тропизмите и настиите се осъществяват посредством растителни и тургорни движения. Растежните движения са резултат от неравномерно нарастване на двете страни на даден орган. Растежните движения са необратим процес. Тургорните движения  възникват вследствие на промяна в тургора-обратим процес</a:t>
             </a:r>
             <a:endParaRPr lang="en-US" dirty="0"/>
@@ -4945,12 +4845,8 @@
           </a:bodyPr>
           <a:lstStyle/>
           <a:p>
-            <a:r>
-              <a:rPr lang="bg-BG" dirty="0" smtClean="0"/>
-              <a:t/>
-            </a:r>
             <a:br>
-              <a:rPr lang="bg-BG" dirty="0" smtClean="0"/>
+              <a:rPr lang="bg-BG" dirty="0"/>
             </a:br>
             <a:endParaRPr lang="en-US" dirty="0"/>
           </a:p>
@@ -4974,7 +4870,7 @@
             <a:pPr marL="0" indent="0">
               <a:buNone/>
             </a:pPr>
-            <a:endParaRPr lang="bg-BG" dirty="0" smtClean="0"/>
+            <a:endParaRPr lang="bg-BG" dirty="0"/>
           </a:p>
           <a:p>
             <a:pPr marL="0" indent="0">
@@ -5007,66 +4903,62 @@
           <a:lstStyle/>
           <a:p>
             <a:r>
-              <a:rPr lang="bg-BG" dirty="0" smtClean="0"/>
+              <a:rPr lang="bg-BG" dirty="0"/>
               <a:t>Б</a:t>
             </a:r>
             <a:r>
-              <a:rPr lang="en-US" dirty="0" smtClean="0"/>
+              <a:rPr lang="en-US" dirty="0"/>
               <a:t>)</a:t>
             </a:r>
             <a:r>
-              <a:rPr lang="bg-BG" dirty="0" smtClean="0"/>
+              <a:rPr lang="bg-BG" dirty="0"/>
               <a:t>Тропизми-наблюдава се растеж от едната страна на растението, като то се извива по посока на дразнителя. Според вида на дразнителя-фототропизъм, гравитропизъм, хемотропизъм. По отношение на посоката на действие на дразнителя-положителни</a:t>
             </a:r>
             <a:r>
-              <a:rPr lang="en-US" dirty="0" smtClean="0"/>
+              <a:rPr lang="en-US" dirty="0"/>
               <a:t>(</a:t>
             </a:r>
             <a:r>
-              <a:rPr lang="bg-BG" dirty="0" smtClean="0"/>
+              <a:rPr lang="bg-BG" dirty="0"/>
               <a:t>към дразнителя</a:t>
             </a:r>
             <a:r>
-              <a:rPr lang="en-US" dirty="0" smtClean="0"/>
+              <a:rPr lang="en-US" dirty="0"/>
               <a:t>)</a:t>
             </a:r>
             <a:r>
-              <a:rPr lang="bg-BG" dirty="0" smtClean="0"/>
+              <a:rPr lang="bg-BG" dirty="0"/>
               <a:t> и отрицателни</a:t>
             </a:r>
             <a:r>
-              <a:rPr lang="en-US" dirty="0" smtClean="0"/>
+              <a:rPr lang="en-US" dirty="0"/>
               <a:t>(</a:t>
             </a:r>
             <a:r>
-              <a:rPr lang="bg-BG" dirty="0" smtClean="0"/>
+              <a:rPr lang="bg-BG" dirty="0"/>
               <a:t>в обратна посока</a:t>
             </a:r>
             <a:r>
-              <a:rPr lang="en-US" dirty="0" smtClean="0"/>
+              <a:rPr lang="en-US" dirty="0"/>
               <a:t>)</a:t>
             </a:r>
-            <a:endParaRPr lang="bg-BG" dirty="0" smtClean="0"/>
-          </a:p>
-          <a:p>
-            <a:endParaRPr lang="bg-BG" dirty="0" smtClean="0"/>
-          </a:p>
-          <a:p>
-            <a:r>
-              <a:rPr lang="bg-BG" dirty="0" smtClean="0"/>
+            <a:endParaRPr lang="bg-BG" dirty="0"/>
+          </a:p>
+          <a:p>
+            <a:endParaRPr lang="bg-BG" dirty="0"/>
+          </a:p>
+          <a:p>
+            <a:r>
+              <a:rPr lang="bg-BG" dirty="0"/>
               <a:t>-Фототропизъм-</a:t>
             </a:r>
             <a:r>
-              <a:rPr lang="ru-RU" dirty="0" smtClean="0"/>
+              <a:rPr lang="ru-RU" dirty="0"/>
               <a:t>движение на растителен орган, обусловено от едностранно действаща светлина. Младите растящи поници, стъблата и листните дръжки имат положителен фототропизъм. Играе роля при ориентиране на растенията за ефективно</a:t>
             </a:r>
             <a:r>
               <a:rPr lang="bg-BG" dirty="0"/>
-              <a:t> </a:t>
-            </a:r>
-            <a:r>
-              <a:rPr lang="bg-BG" dirty="0" smtClean="0"/>
-              <a:t>„улавяне“ на слънчеевата светлина. </a:t>
+              <a:t> „улавяне“ на слънчеевата светлина. </a:t>
             </a:r>
             <a:endParaRPr lang="en-US" dirty="0"/>
           </a:p>
@@ -5160,12 +5052,8 @@
           </a:bodyPr>
           <a:lstStyle/>
           <a:p>
-            <a:r>
-              <a:rPr lang="bg-BG" dirty="0" smtClean="0"/>
-              <a:t/>
-            </a:r>
             <a:br>
-              <a:rPr lang="bg-BG" dirty="0" smtClean="0"/>
+              <a:rPr lang="bg-BG" dirty="0"/>
             </a:br>
             <a:endParaRPr lang="en-US" dirty="0"/>
           </a:p>
@@ -5189,7 +5077,7 @@
             <a:pPr marL="0" indent="0">
               <a:buNone/>
             </a:pPr>
-            <a:endParaRPr lang="bg-BG" dirty="0" smtClean="0"/>
+            <a:endParaRPr lang="bg-BG" dirty="0"/>
           </a:p>
           <a:p>
             <a:pPr marL="0" indent="0">
@@ -5222,7 +5110,7 @@
           <a:lstStyle/>
           <a:p>
             <a:r>
-              <a:rPr lang="bg-BG" dirty="0" smtClean="0"/>
+              <a:rPr lang="bg-BG" dirty="0"/>
               <a:t> </a:t>
             </a:r>
             <a:endParaRPr lang="en-US" dirty="0"/>
@@ -5252,23 +5140,23 @@
           <a:lstStyle/>
           <a:p>
             <a:r>
-              <a:rPr lang="bg-BG" dirty="0" smtClean="0"/>
+              <a:rPr lang="bg-BG" dirty="0"/>
               <a:t>-Гравитропизъм</a:t>
             </a:r>
             <a:r>
-              <a:rPr lang="en-US" dirty="0" smtClean="0"/>
+              <a:rPr lang="en-US" dirty="0"/>
               <a:t>(</a:t>
             </a:r>
             <a:r>
-              <a:rPr lang="bg-BG" dirty="0" smtClean="0"/>
+              <a:rPr lang="bg-BG" dirty="0"/>
               <a:t>геотропизъм</a:t>
             </a:r>
             <a:r>
-              <a:rPr lang="en-US" dirty="0" smtClean="0"/>
+              <a:rPr lang="en-US" dirty="0"/>
               <a:t>)</a:t>
             </a:r>
             <a:r>
-              <a:rPr lang="bg-BG" dirty="0" smtClean="0"/>
+              <a:rPr lang="bg-BG" dirty="0"/>
               <a:t>-Движения индуцирани от гравитацията. Извиването е резултат отнеравномерния растеж на противоположните страни на растящия орган. </a:t>
             </a:r>
           </a:p>
@@ -5278,7 +5166,7 @@
               <a:buChar char="•"/>
             </a:pPr>
             <a:r>
-              <a:rPr lang="bg-BG" dirty="0" smtClean="0"/>
+              <a:rPr lang="bg-BG" dirty="0"/>
               <a:t>Положителен гравитропизъм проявяват главните корени, мъхове и водорасли</a:t>
             </a:r>
           </a:p>
@@ -5288,7 +5176,7 @@
               <a:buChar char="•"/>
             </a:pPr>
             <a:r>
-              <a:rPr lang="bg-BG" dirty="0" smtClean="0"/>
+              <a:rPr lang="bg-BG" dirty="0"/>
               <a:t>Отрицателен гравитропизъм проявяват главните стъбла</a:t>
             </a:r>
           </a:p>
@@ -5301,7 +5189,7 @@
           </a:p>
           <a:p>
             <a:r>
-              <a:rPr lang="bg-BG" dirty="0" smtClean="0"/>
+              <a:rPr lang="bg-BG" dirty="0"/>
               <a:t>За изясняване на механизма на гравитропната реакция има две основни теории-статолитната и хормоналната</a:t>
             </a:r>
             <a:endParaRPr lang="en-US" dirty="0"/>
@@ -5396,12 +5284,8 @@
           </a:bodyPr>
           <a:lstStyle/>
           <a:p>
-            <a:r>
-              <a:rPr lang="bg-BG" dirty="0" smtClean="0"/>
-              <a:t/>
-            </a:r>
             <a:br>
-              <a:rPr lang="bg-BG" dirty="0" smtClean="0"/>
+              <a:rPr lang="bg-BG" dirty="0"/>
             </a:br>
             <a:endParaRPr lang="en-US" dirty="0"/>
           </a:p>
@@ -5425,7 +5309,7 @@
             <a:pPr marL="0" indent="0">
               <a:buNone/>
             </a:pPr>
-            <a:endParaRPr lang="bg-BG" dirty="0" smtClean="0"/>
+            <a:endParaRPr lang="bg-BG" dirty="0"/>
           </a:p>
           <a:p>
             <a:pPr marL="0" indent="0">
@@ -5458,7 +5342,7 @@
           <a:lstStyle/>
           <a:p>
             <a:r>
-              <a:rPr lang="bg-BG" dirty="0" smtClean="0"/>
+              <a:rPr lang="bg-BG" dirty="0"/>
               <a:t>-Хемотропизъм- Движение на растящите органи, обусловени от химичен градиент. Хемотропизъм проявяват корените, прорастъците на паразитните растХения, жлезистите власинки на насекомоядните растения</a:t>
             </a:r>
           </a:p>
@@ -5466,32 +5350,32 @@
             <a:endParaRPr lang="bg-BG" dirty="0"/>
           </a:p>
           <a:p>
-            <a:endParaRPr lang="bg-BG" dirty="0" smtClean="0"/>
-          </a:p>
-          <a:p>
             <a:endParaRPr lang="bg-BG" dirty="0"/>
           </a:p>
           <a:p>
-            <a:endParaRPr lang="bg-BG" dirty="0" smtClean="0"/>
-          </a:p>
-          <a:p>
             <a:endParaRPr lang="bg-BG" dirty="0"/>
           </a:p>
           <a:p>
-            <a:endParaRPr lang="bg-BG" dirty="0" smtClean="0"/>
-          </a:p>
-          <a:p>
             <a:endParaRPr lang="bg-BG" dirty="0"/>
           </a:p>
           <a:p>
-            <a:endParaRPr lang="bg-BG" dirty="0" smtClean="0"/>
-          </a:p>
-          <a:p>
             <a:endParaRPr lang="bg-BG" dirty="0"/>
           </a:p>
           <a:p>
-            <a:r>
-              <a:rPr lang="bg-BG" dirty="0" smtClean="0"/>
+            <a:endParaRPr lang="bg-BG" dirty="0"/>
+          </a:p>
+          <a:p>
+            <a:endParaRPr lang="bg-BG" dirty="0"/>
+          </a:p>
+          <a:p>
+            <a:endParaRPr lang="bg-BG" dirty="0"/>
+          </a:p>
+          <a:p>
+            <a:endParaRPr lang="bg-BG" dirty="0"/>
+          </a:p>
+          <a:p>
+            <a:r>
+              <a:rPr lang="bg-BG" dirty="0"/>
               <a:t>-Хидротропизъм- Неравномерно разпределение на водата. Корените проявяват положителен хидротропизъм, </a:t>
             </a:r>
             <a:endParaRPr lang="en-US" dirty="0"/>
@@ -5545,12 +5429,8 @@
           </a:bodyPr>
           <a:lstStyle/>
           <a:p>
-            <a:r>
-              <a:rPr lang="bg-BG" dirty="0" smtClean="0"/>
-              <a:t/>
-            </a:r>
             <a:br>
-              <a:rPr lang="bg-BG" dirty="0" smtClean="0"/>
+              <a:rPr lang="bg-BG" dirty="0"/>
             </a:br>
             <a:endParaRPr lang="en-US" dirty="0"/>
           </a:p>
@@ -5574,7 +5454,7 @@
             <a:pPr marL="0" indent="0">
               <a:buNone/>
             </a:pPr>
-            <a:endParaRPr lang="bg-BG" dirty="0" smtClean="0"/>
+            <a:endParaRPr lang="bg-BG" dirty="0"/>
           </a:p>
           <a:p>
             <a:pPr marL="0" indent="0">
@@ -5607,7 +5487,7 @@
           <a:lstStyle/>
           <a:p>
             <a:r>
-              <a:rPr lang="bg-BG" dirty="0" smtClean="0"/>
+              <a:rPr lang="bg-BG" dirty="0"/>
               <a:t>-Термотропизъм-представлява извиване на растящия в отговор на едностранно действащо топлинно излъчване</a:t>
             </a:r>
           </a:p>
@@ -5615,14 +5495,14 @@
             <a:endParaRPr lang="bg-BG" dirty="0"/>
           </a:p>
           <a:p>
-            <a:endParaRPr lang="bg-BG" dirty="0" smtClean="0"/>
-          </a:p>
-          <a:p>
             <a:endParaRPr lang="bg-BG" dirty="0"/>
           </a:p>
           <a:p>
-            <a:r>
-              <a:rPr lang="bg-BG" dirty="0" smtClean="0"/>
+            <a:endParaRPr lang="bg-BG" dirty="0"/>
+          </a:p>
+          <a:p>
+            <a:r>
+              <a:rPr lang="bg-BG" dirty="0"/>
               <a:t>-Тигмонастии-движение, предизвикано от допир. Наблюдава се при мустачките на лоза, краставици, грах</a:t>
             </a:r>
             <a:endParaRPr lang="en-US" dirty="0"/>
@@ -5717,12 +5597,8 @@
           </a:bodyPr>
           <a:lstStyle/>
           <a:p>
-            <a:r>
-              <a:rPr lang="bg-BG" dirty="0" smtClean="0"/>
-              <a:t/>
-            </a:r>
             <a:br>
-              <a:rPr lang="bg-BG" dirty="0" smtClean="0"/>
+              <a:rPr lang="bg-BG" dirty="0"/>
             </a:br>
             <a:endParaRPr lang="en-US" dirty="0"/>
           </a:p>
@@ -5746,7 +5622,7 @@
             <a:pPr marL="0" indent="0">
               <a:buNone/>
             </a:pPr>
-            <a:endParaRPr lang="bg-BG" dirty="0" smtClean="0"/>
+            <a:endParaRPr lang="bg-BG" dirty="0"/>
           </a:p>
           <a:p>
             <a:pPr marL="0" indent="0">
@@ -5779,15 +5655,15 @@
           <a:lstStyle/>
           <a:p>
             <a:r>
-              <a:rPr lang="bg-BG" dirty="0" smtClean="0"/>
+              <a:rPr lang="bg-BG" dirty="0"/>
               <a:t>В</a:t>
             </a:r>
             <a:r>
-              <a:rPr lang="en-US" dirty="0" smtClean="0"/>
+              <a:rPr lang="en-US" dirty="0"/>
               <a:t>)</a:t>
             </a:r>
             <a:r>
-              <a:rPr lang="bg-BG" dirty="0" smtClean="0"/>
+              <a:rPr lang="bg-BG" dirty="0"/>
               <a:t>Настии-Дифузно действащи дразнители, които могат да предизвикат настии са температура, влажност на средата, осветеност</a:t>
             </a:r>
           </a:p>
@@ -5796,7 +5672,7 @@
           </a:p>
           <a:p>
             <a:r>
-              <a:rPr lang="bg-BG" dirty="0" smtClean="0"/>
+              <a:rPr lang="bg-BG" dirty="0"/>
               <a:t>-Никтинастии-движения предизвикани от редуване на деня и нощта. Някои цветове се разтварят сутрин и се затварят вечер. Осъществяват се с цел улесняване на опрашването. </a:t>
             </a:r>
           </a:p>
@@ -5804,11 +5680,11 @@
             <a:endParaRPr lang="bg-BG" dirty="0"/>
           </a:p>
           <a:p>
-            <a:endParaRPr lang="bg-BG" dirty="0" smtClean="0"/>
-          </a:p>
-          <a:p>
-            <a:r>
-              <a:rPr lang="bg-BG" dirty="0" smtClean="0"/>
+            <a:endParaRPr lang="bg-BG" dirty="0"/>
+          </a:p>
+          <a:p>
+            <a:r>
+              <a:rPr lang="bg-BG" dirty="0"/>
               <a:t>-Фотонастии проявяват цветните кошнички на глухарчето и други като се затварят вечер или при изкуствено затъмняване. Тези движения са растежни-ответната реакция се дължи на неравномерния растеж от горната и долната страна на венчелистчетата</a:t>
             </a:r>
           </a:p>
@@ -5816,11 +5692,11 @@
             <a:endParaRPr lang="bg-BG" dirty="0"/>
           </a:p>
           <a:p>
-            <a:endParaRPr lang="bg-BG" dirty="0" smtClean="0"/>
-          </a:p>
-          <a:p>
-            <a:r>
-              <a:rPr lang="bg-BG" dirty="0" smtClean="0"/>
+            <a:endParaRPr lang="bg-BG" dirty="0"/>
+          </a:p>
+          <a:p>
+            <a:r>
+              <a:rPr lang="bg-BG" dirty="0"/>
               <a:t>Термонастии се срещат особено често при пролетните растения. Цветовете на минзухара и лалето се разтварят, ако се пренесат в топла стая</a:t>
             </a:r>
           </a:p>
@@ -5917,12 +5793,8 @@
           </a:bodyPr>
           <a:lstStyle/>
           <a:p>
-            <a:r>
-              <a:rPr lang="bg-BG" dirty="0" smtClean="0"/>
-              <a:t/>
-            </a:r>
             <a:br>
-              <a:rPr lang="bg-BG" dirty="0" smtClean="0"/>
+              <a:rPr lang="bg-BG" dirty="0"/>
             </a:br>
             <a:endParaRPr lang="en-US" dirty="0"/>
           </a:p>
@@ -5946,7 +5818,7 @@
             <a:pPr marL="0" indent="0">
               <a:buNone/>
             </a:pPr>
-            <a:endParaRPr lang="bg-BG" dirty="0" smtClean="0"/>
+            <a:endParaRPr lang="bg-BG" dirty="0"/>
           </a:p>
           <a:p>
             <a:pPr marL="0" indent="0">
@@ -5979,7 +5851,7 @@
           <a:lstStyle/>
           <a:p>
             <a:r>
-              <a:rPr lang="bg-BG" dirty="0" smtClean="0"/>
+              <a:rPr lang="bg-BG" dirty="0"/>
               <a:t>-Тигмонастиите са най-ясно изразени при мустачките,които са чувствителни към докосване. Тигмонастичните движения в началото са тургорни движения, а по-късно се прибавя и растежно движение. При росянката в отговор на допир на грапави предмети</a:t>
             </a:r>
           </a:p>
@@ -5987,60 +5859,59 @@
             <a:endParaRPr lang="bg-BG" dirty="0"/>
           </a:p>
           <a:p>
-            <a:endParaRPr lang="bg-BG" dirty="0" smtClean="0"/>
-          </a:p>
-          <a:p>
             <a:endParaRPr lang="bg-BG" dirty="0"/>
           </a:p>
           <a:p>
-            <a:endParaRPr lang="bg-BG" dirty="0" smtClean="0"/>
-          </a:p>
-          <a:p>
             <a:endParaRPr lang="bg-BG" dirty="0"/>
           </a:p>
           <a:p>
-            <a:endParaRPr lang="bg-BG" dirty="0" smtClean="0"/>
-          </a:p>
-          <a:p>
             <a:endParaRPr lang="bg-BG" dirty="0"/>
           </a:p>
           <a:p>
-            <a:endParaRPr lang="bg-BG" dirty="0" smtClean="0"/>
-          </a:p>
-          <a:p>
             <a:endParaRPr lang="bg-BG" dirty="0"/>
           </a:p>
           <a:p>
-            <a:endParaRPr lang="bg-BG" dirty="0" smtClean="0"/>
-          </a:p>
-          <a:p>
             <a:endParaRPr lang="bg-BG" dirty="0"/>
           </a:p>
           <a:p>
-            <a:endParaRPr lang="bg-BG" dirty="0" smtClean="0"/>
-          </a:p>
-          <a:p>
-            <a:r>
-              <a:rPr lang="bg-BG" dirty="0" smtClean="0"/>
+            <a:endParaRPr lang="bg-BG" dirty="0"/>
+          </a:p>
+          <a:p>
+            <a:endParaRPr lang="bg-BG" dirty="0"/>
+          </a:p>
+          <a:p>
+            <a:endParaRPr lang="bg-BG" dirty="0"/>
+          </a:p>
+          <a:p>
+            <a:endParaRPr lang="bg-BG" dirty="0"/>
+          </a:p>
+          <a:p>
+            <a:endParaRPr lang="bg-BG" dirty="0"/>
+          </a:p>
+          <a:p>
+            <a:endParaRPr lang="bg-BG" dirty="0"/>
+          </a:p>
+          <a:p>
+            <a:r>
+              <a:rPr lang="bg-BG" dirty="0"/>
               <a:t>-Хемонастиите са свойствени за насекомоядните растения. Жлезистите власинки на росянката реагират първо на дразненето от насекомите и допира</a:t>
             </a:r>
             <a:r>
-              <a:rPr lang="en-US" dirty="0" smtClean="0"/>
+              <a:rPr lang="en-US" dirty="0"/>
               <a:t>(</a:t>
             </a:r>
             <a:r>
-              <a:rPr lang="bg-BG" dirty="0" smtClean="0"/>
+              <a:rPr lang="bg-BG" dirty="0"/>
               <a:t>тигмонастия</a:t>
             </a:r>
             <a:r>
-              <a:rPr lang="en-US" dirty="0" smtClean="0"/>
+              <a:rPr lang="en-US" dirty="0"/>
               <a:t>)</a:t>
             </a:r>
             <a:r>
-              <a:rPr lang="bg-BG" dirty="0" smtClean="0"/>
+              <a:rPr lang="bg-BG" dirty="0"/>
               <a:t>, но извиванията се предизвикват от химични дразнители.</a:t>
             </a:r>
-            <a:endParaRPr lang="bg-BG" dirty="0"/>
           </a:p>
         </p:txBody>
       </p:sp>
@@ -6558,6 +6429,12 @@
 </file>
 
 <file path=customXml/item2.xml><?xml version="1.0" encoding="utf-8"?>
+<p:properties xmlns:p="http://schemas.microsoft.com/office/2006/metadata/properties" xmlns:xsi="http://www.w3.org/2001/XMLSchema-instance" xmlns:pc="http://schemas.microsoft.com/office/infopath/2007/PartnerControls">
+  <documentManagement/>
+</p:properties>
+</file>
+
+<file path=customXml/item3.xml><?xml version="1.0" encoding="utf-8"?>
 <?mso-contentType ?>
 <FormTemplates xmlns="http://schemas.microsoft.com/sharepoint/v3/contenttype/forms">
   <Display>DocumentLibraryForm</Display>
@@ -6566,20 +6443,37 @@
 </FormTemplates>
 </file>
 
-<file path=customXml/item3.xml><?xml version="1.0" encoding="utf-8"?>
-<p:properties xmlns:p="http://schemas.microsoft.com/office/2006/metadata/properties" xmlns:xsi="http://www.w3.org/2001/XMLSchema-instance" xmlns:pc="http://schemas.microsoft.com/office/infopath/2007/PartnerControls">
-  <documentManagement/>
-</p:properties>
-</file>
-
 <file path=customXml/itemProps1.xml><?xml version="1.0" encoding="utf-8"?>
-<ds:datastoreItem xmlns:ds="http://schemas.openxmlformats.org/officeDocument/2006/customXml" ds:itemID="{1B49DE62-82AB-4035-B8A3-99E82F7906F2}"/>
+<ds:datastoreItem xmlns:ds="http://schemas.openxmlformats.org/officeDocument/2006/customXml" ds:itemID="{1B49DE62-82AB-4035-B8A3-99E82F7906F2}">
+  <ds:schemaRefs>
+    <ds:schemaRef ds:uri="http://schemas.microsoft.com/office/2006/metadata/contentType"/>
+    <ds:schemaRef ds:uri="http://schemas.microsoft.com/office/2006/metadata/properties/metaAttributes"/>
+    <ds:schemaRef ds:uri="http://www.w3.org/2001/XMLSchema"/>
+    <ds:schemaRef ds:uri="http://schemas.microsoft.com/office/2006/metadata/properties"/>
+    <ds:schemaRef ds:uri="e3e44e0f-f064-4a0d-a1c8-84610c3f466b"/>
+    <ds:schemaRef ds:uri="http://schemas.microsoft.com/office/2006/documentManagement/types"/>
+    <ds:schemaRef ds:uri="http://schemas.microsoft.com/office/infopath/2007/PartnerControls"/>
+    <ds:schemaRef ds:uri="http://schemas.openxmlformats.org/package/2006/metadata/core-properties"/>
+    <ds:schemaRef ds:uri="http://purl.org/dc/elements/1.1/"/>
+    <ds:schemaRef ds:uri="http://purl.org/dc/terms/"/>
+    <ds:schemaRef ds:uri="http://schemas.microsoft.com/internal/obd"/>
+  </ds:schemaRefs>
+</ds:datastoreItem>
 </file>
 
 <file path=customXml/itemProps2.xml><?xml version="1.0" encoding="utf-8"?>
-<ds:datastoreItem xmlns:ds="http://schemas.openxmlformats.org/officeDocument/2006/customXml" ds:itemID="{D706509B-E6FC-4F1E-A30F-9FF46CA59FBF}"/>
+<ds:datastoreItem xmlns:ds="http://schemas.openxmlformats.org/officeDocument/2006/customXml" ds:itemID="{B72EEE41-2D98-4CBE-BC47-77D3F128519D}">
+  <ds:schemaRefs>
+    <ds:schemaRef ds:uri="http://schemas.microsoft.com/office/2006/metadata/properties"/>
+    <ds:schemaRef ds:uri="http://schemas.microsoft.com/office/infopath/2007/PartnerControls"/>
+  </ds:schemaRefs>
+</ds:datastoreItem>
 </file>
 
 <file path=customXml/itemProps3.xml><?xml version="1.0" encoding="utf-8"?>
-<ds:datastoreItem xmlns:ds="http://schemas.openxmlformats.org/officeDocument/2006/customXml" ds:itemID="{B72EEE41-2D98-4CBE-BC47-77D3F128519D}"/>
+<ds:datastoreItem xmlns:ds="http://schemas.openxmlformats.org/officeDocument/2006/customXml" ds:itemID="{D706509B-E6FC-4F1E-A30F-9FF46CA59FBF}">
+  <ds:schemaRefs>
+    <ds:schemaRef ds:uri="http://schemas.microsoft.com/sharepoint/v3/contenttype/forms"/>
+  </ds:schemaRefs>
+</ds:datastoreItem>
 </file>
</xml_diff>